<commit_message>
Modifications by Arjun Arkal Rao
This SHOULD NOT be merged.
Testing PR with pptx
</commit_message>
<xml_diff>
--- a/UP Review_Teaching.pptx
+++ b/UP Review_Teaching.pptx
@@ -253,7 +253,7 @@
             <a:fld id="{6D2FF3F0-DB8D-444E-B6A4-4764F78E699F}" type="datetimeFigureOut">
               <a:rPr lang="en-GB" smtClean="0"/>
               <a:pPr/>
-              <a:t>12/02/2020</a:t>
+              <a:t>24/03/2020</a:t>
             </a:fld>
             <a:endParaRPr lang="en-GB"/>
           </a:p>
@@ -1498,7 +1498,7 @@
             <a:fld id="{A1C89658-FBDE-224D-88DE-D9AAB616238A}" type="datetimeFigureOut">
               <a:rPr lang="en-US" smtClean="0"/>
               <a:pPr/>
-              <a:t>2/12/20</a:t>
+              <a:t>3/24/20</a:t>
             </a:fld>
             <a:endParaRPr lang="en-GB"/>
           </a:p>
@@ -2105,7 +2105,7 @@
                 </a:solidFill>
               </a:rPr>
               <a:pPr/>
-              <a:t>2/12/20</a:t>
+              <a:t>3/24/20</a:t>
             </a:fld>
             <a:endParaRPr lang="en-US">
               <a:solidFill>
@@ -2350,7 +2350,7 @@
             <a:fld id="{A1C89658-FBDE-224D-88DE-D9AAB616238A}" type="datetimeFigureOut">
               <a:rPr lang="en-US" smtClean="0"/>
               <a:pPr/>
-              <a:t>2/12/20</a:t>
+              <a:t>3/24/20</a:t>
             </a:fld>
             <a:endParaRPr lang="en-GB"/>
           </a:p>
@@ -6057,7 +6057,7 @@
         <p:spPr>
           <a:xfrm>
             <a:off x="457200" y="1039942"/>
-            <a:ext cx="8260210" cy="2554545"/>
+            <a:ext cx="8260210" cy="2185214"/>
           </a:xfrm>
           <a:prstGeom prst="rect">
             <a:avLst/>
@@ -6117,26 +6117,12 @@
               <a:buChar char="•"/>
             </a:pPr>
             <a:r>
-              <a:rPr lang="en-US" sz="2400" dirty="0">
+              <a:rPr lang="en-US" sz="2400">
                 <a:latin typeface="Helvetica Neue" charset="0"/>
                 <a:ea typeface="Helvetica Neue" charset="0"/>
                 <a:cs typeface="Helvetica Neue" charset="0"/>
               </a:rPr>
               <a:t>Reproducibility</a:t>
-            </a:r>
-          </a:p>
-          <a:p>
-            <a:pPr marL="800100" lvl="1" indent="-342900">
-              <a:buFont typeface="Arial" panose="020B0604020202020204" pitchFamily="34" charset="0"/>
-              <a:buChar char="•"/>
-            </a:pPr>
-            <a:r>
-              <a:rPr lang="en-US" sz="2400" dirty="0">
-                <a:latin typeface="Helvetica Neue" charset="0"/>
-                <a:ea typeface="Helvetica Neue" charset="0"/>
-                <a:cs typeface="Helvetica Neue" charset="0"/>
-              </a:rPr>
-              <a:t>Scholarship</a:t>
             </a:r>
           </a:p>
           <a:p>

</xml_diff>